<commit_message>
updated links in module 1 tutorial
</commit_message>
<xml_diff>
--- a/LectureFiles/cbw/2015/RNASeq_Module1_Tutorial.pptx
+++ b/LectureFiles/cbw/2015/RNASeq_Module1_Tutorial.pptx
@@ -263,7 +263,7 @@
               <a:pPr>
                 <a:defRPr/>
               </a:pPr>
-              <a:t>6/1/15</a:t>
+              <a:t>6/8/15</a:t>
             </a:fld>
             <a:endParaRPr lang="en-US"/>
           </a:p>
@@ -478,7 +478,7 @@
               <a:pPr>
                 <a:defRPr/>
               </a:pPr>
-              <a:t>6/1/15</a:t>
+              <a:t>6/8/15</a:t>
             </a:fld>
             <a:endParaRPr lang="en-US"/>
           </a:p>
@@ -4831,7 +4831,7 @@
               <a:pPr>
                 <a:defRPr/>
               </a:pPr>
-              <a:t>6/1/15</a:t>
+              <a:t>6/8/15</a:t>
             </a:fld>
             <a:endParaRPr lang="en-US"/>
           </a:p>
@@ -7894,22 +7894,7 @@
                 <a:ea typeface="+mn-ea"/>
                 <a:cs typeface="Calibri"/>
               </a:rPr>
-              <a:t>June 8-9, </a:t>
-            </a:r>
-            <a:r>
-              <a:rPr lang="en-US" sz="1400" dirty="0" smtClean="0">
-                <a:ln w="1270">
-                  <a:solidFill>
-                    <a:schemeClr val="tx1">
-                      <a:alpha val="38000"/>
-                    </a:schemeClr>
-                  </a:solidFill>
-                </a:ln>
-                <a:latin typeface="Calibri"/>
-                <a:ea typeface="+mn-ea"/>
-                <a:cs typeface="Calibri"/>
-              </a:rPr>
-              <a:t>2015</a:t>
+              <a:t>June 8-9, 2015</a:t>
             </a:r>
           </a:p>
         </p:txBody>
@@ -8435,6 +8420,13 @@
   <p:clrMapOvr>
     <a:masterClrMapping/>
   </p:clrMapOvr>
+  <p:timing>
+    <p:tnLst>
+      <p:par>
+        <p:cTn xmlns:p14="http://schemas.microsoft.com/office/powerpoint/2010/main" id="1" dur="indefinite" restart="never" nodeType="tmRoot"/>
+      </p:par>
+    </p:tnLst>
+  </p:timing>
 </p:sld>
 </file>
 
@@ -8996,7 +8988,7 @@
               <a:defRPr/>
             </a:pPr>
             <a:r>
-              <a:rPr lang="en-US" sz="2200" dirty="0" err="1">
+              <a:rPr lang="en-US" sz="2300" dirty="0" err="1">
                 <a:latin typeface="Calibri" charset="0"/>
                 <a:ea typeface="ＭＳ Ｐゴシック" charset="0"/>
               </a:rPr>
@@ -9097,7 +9089,7 @@
               <a:defRPr/>
             </a:pPr>
             <a:r>
-              <a:rPr lang="en-US" sz="2600" dirty="0" smtClean="0">
+              <a:rPr lang="en-US" sz="2300" dirty="0" smtClean="0">
                 <a:latin typeface="Calibri" charset="0"/>
                 <a:ea typeface="ＭＳ Ｐゴシック" charset="0"/>
               </a:rPr>
@@ -9136,7 +9128,7 @@
               <a:defRPr/>
             </a:pPr>
             <a:r>
-              <a:rPr lang="en-US" sz="2200" dirty="0" err="1">
+              <a:rPr lang="en-US" sz="2300" dirty="0" err="1">
                 <a:latin typeface="Calibri" charset="0"/>
                 <a:ea typeface="ＭＳ Ｐゴシック" charset="0"/>
               </a:rPr>
@@ -9160,9 +9152,17 @@
                 <a:ea typeface="ＭＳ Ｐゴシック" charset="0"/>
                 <a:hlinkClick r:id="rId6"/>
               </a:rPr>
-              <a:t>http://tophat.cbcb.umd.edu/</a:t>
-            </a:r>
-            <a:endParaRPr lang="en-US" sz="1900" dirty="0">
+              <a:t>http://ccb.jhu.edu/software/tophat/</a:t>
+            </a:r>
+            <a:r>
+              <a:rPr lang="en-US" sz="1900" dirty="0" smtClean="0">
+                <a:latin typeface="Calibri" charset="0"/>
+                <a:ea typeface="ＭＳ Ｐゴシック" charset="0"/>
+                <a:hlinkClick r:id="rId6"/>
+              </a:rPr>
+              <a:t>index.shtml</a:t>
+            </a:r>
+            <a:endParaRPr lang="en-US" sz="1900" dirty="0" smtClean="0">
               <a:latin typeface="Calibri" charset="0"/>
               <a:ea typeface="ＭＳ Ｐゴシック" charset="0"/>
             </a:endParaRPr>
@@ -9175,12 +9175,16 @@
               <a:defRPr/>
             </a:pPr>
             <a:r>
-              <a:rPr lang="en-US" sz="2200" dirty="0" smtClean="0">
+              <a:rPr lang="en-US" sz="2300" dirty="0" smtClean="0">
                 <a:latin typeface="Calibri" charset="0"/>
                 <a:ea typeface="ＭＳ Ｐゴシック" charset="0"/>
               </a:rPr>
               <a:t>STAR</a:t>
             </a:r>
+            <a:endParaRPr lang="en-US" sz="2600" dirty="0" smtClean="0">
+              <a:latin typeface="Calibri" charset="0"/>
+              <a:ea typeface="ＭＳ Ｐゴシック" charset="0"/>
+            </a:endParaRPr>
           </a:p>
           <a:p>
             <a:pPr lvl="2">
@@ -9218,7 +9222,7 @@
               <a:defRPr/>
             </a:pPr>
             <a:r>
-              <a:rPr lang="en-US" sz="2200" dirty="0" smtClean="0">
+              <a:rPr lang="en-US" sz="2300" dirty="0" smtClean="0">
                 <a:latin typeface="Calibri" charset="0"/>
                 <a:ea typeface="ＭＳ Ｐゴシック" charset="0"/>
               </a:rPr>
@@ -9240,15 +9244,15 @@
               <a:rPr lang="en-US" sz="1900" dirty="0">
                 <a:latin typeface="Calibri" charset="0"/>
                 <a:ea typeface="ＭＳ Ｐゴシック" charset="0"/>
-                <a:hlinkClick r:id="rId6"/>
-              </a:rPr>
-              <a:t>http://tophat.cbcb.umd.edu</a:t>
+                <a:hlinkClick r:id="rId8"/>
+              </a:rPr>
+              <a:t>http://cole-trapnell-lab.github.io/cufflinks</a:t>
             </a:r>
             <a:r>
               <a:rPr lang="en-US" sz="1900" dirty="0" smtClean="0">
                 <a:latin typeface="Calibri" charset="0"/>
                 <a:ea typeface="ＭＳ Ｐゴシック" charset="0"/>
-                <a:hlinkClick r:id="rId6"/>
+                <a:hlinkClick r:id="rId8"/>
               </a:rPr>
               <a:t>/</a:t>
             </a:r>
@@ -9287,18 +9291,26 @@
               <a:defRPr/>
             </a:pPr>
             <a:r>
+              <a:rPr lang="en-US" sz="1900" dirty="0" smtClean="0">
+                <a:latin typeface="Calibri" charset="0"/>
+                <a:ea typeface="ＭＳ Ｐゴシック" charset="0"/>
+                <a:hlinkClick r:id="rId9"/>
+              </a:rPr>
+              <a:t>http</a:t>
+            </a:r>
+            <a:r>
               <a:rPr lang="en-US" sz="1900" dirty="0">
                 <a:latin typeface="Calibri" charset="0"/>
                 <a:ea typeface="ＭＳ Ｐゴシック" charset="0"/>
-                <a:hlinkClick r:id="rId8"/>
-              </a:rPr>
-              <a:t>http://www-huber.embl.de/users/anders/HTSeq/doc/</a:t>
+                <a:hlinkClick r:id="rId9"/>
+              </a:rPr>
+              <a:t>://www-huber.embl.de/users/anders/HTSeq/doc/</a:t>
             </a:r>
             <a:r>
               <a:rPr lang="en-US" sz="1900" dirty="0" smtClean="0">
                 <a:latin typeface="Calibri" charset="0"/>
                 <a:ea typeface="ＭＳ Ｐゴシック" charset="0"/>
-                <a:hlinkClick r:id="rId8"/>
+                <a:hlinkClick r:id="rId9"/>
               </a:rPr>
               <a:t>count.html</a:t>
             </a:r>
@@ -9315,48 +9327,48 @@
               <a:defRPr/>
             </a:pPr>
             <a:r>
-              <a:rPr lang="en-US" sz="2200" dirty="0" smtClean="0">
+              <a:rPr lang="en-US" sz="2300" dirty="0" smtClean="0">
                 <a:latin typeface="Calibri" charset="0"/>
                 <a:ea typeface="ＭＳ Ｐゴシック" charset="0"/>
               </a:rPr>
               <a:t>R/</a:t>
             </a:r>
             <a:r>
-              <a:rPr lang="en-US" sz="2000" dirty="0" err="1" smtClean="0">
+              <a:rPr lang="en-US" sz="2300" dirty="0" err="1" smtClean="0">
                 <a:latin typeface="Calibri" charset="0"/>
                 <a:ea typeface="ＭＳ Ｐゴシック" charset="0"/>
               </a:rPr>
               <a:t>Bioconductor</a:t>
             </a:r>
             <a:r>
-              <a:rPr lang="en-US" sz="2000" dirty="0">
+              <a:rPr lang="en-US" sz="2300" dirty="0">
                 <a:latin typeface="Calibri" charset="0"/>
                 <a:ea typeface="ＭＳ Ｐゴシック" charset="0"/>
               </a:rPr>
               <a:t>/</a:t>
             </a:r>
             <a:r>
-              <a:rPr lang="en-US" sz="2000" dirty="0" err="1" smtClean="0">
+              <a:rPr lang="en-US" sz="2300" dirty="0" err="1" smtClean="0">
                 <a:latin typeface="Calibri" charset="0"/>
                 <a:ea typeface="ＭＳ Ｐゴシック" charset="0"/>
               </a:rPr>
               <a:t>CummeRbund</a:t>
             </a:r>
             <a:r>
-              <a:rPr lang="en-US" sz="2000" dirty="0" smtClean="0">
+              <a:rPr lang="en-US" sz="2300" dirty="0" smtClean="0">
                 <a:latin typeface="Calibri" charset="0"/>
                 <a:ea typeface="ＭＳ Ｐゴシック" charset="0"/>
               </a:rPr>
               <a:t>/</a:t>
             </a:r>
             <a:r>
-              <a:rPr lang="en-US" sz="2000" dirty="0" err="1" smtClean="0">
+              <a:rPr lang="en-US" sz="2300" dirty="0" err="1" smtClean="0">
                 <a:latin typeface="Calibri" charset="0"/>
                 <a:ea typeface="ＭＳ Ｐゴシック" charset="0"/>
               </a:rPr>
               <a:t>edgeR</a:t>
             </a:r>
-            <a:endParaRPr lang="en-US" sz="2200" dirty="0">
+            <a:endParaRPr lang="en-US" sz="2300" dirty="0">
               <a:latin typeface="Calibri" charset="0"/>
               <a:ea typeface="ＭＳ Ｐゴシック" charset="0"/>
             </a:endParaRPr>
@@ -9372,7 +9384,7 @@
               <a:rPr lang="en-US" sz="1900" dirty="0">
                 <a:latin typeface="Calibri" charset="0"/>
                 <a:ea typeface="ＭＳ Ｐゴシック" charset="0"/>
-                <a:hlinkClick r:id="rId9"/>
+                <a:hlinkClick r:id="rId10"/>
               </a:rPr>
               <a:t>http://cran.r-project.org</a:t>
             </a:r>
@@ -9380,7 +9392,7 @@
               <a:rPr lang="en-US" sz="1900" dirty="0" smtClean="0">
                 <a:latin typeface="Calibri" charset="0"/>
                 <a:ea typeface="ＭＳ Ｐゴシック" charset="0"/>
-                <a:hlinkClick r:id="rId9"/>
+                <a:hlinkClick r:id="rId10"/>
               </a:rPr>
               <a:t>/</a:t>
             </a:r>
@@ -9400,7 +9412,7 @@
               <a:rPr lang="en-US" sz="1900" dirty="0" smtClean="0">
                 <a:latin typeface="Calibri" charset="0"/>
                 <a:ea typeface="ＭＳ Ｐゴシック" charset="0"/>
-                <a:hlinkClick r:id="rId10"/>
+                <a:hlinkClick r:id="rId11"/>
               </a:rPr>
               <a:t>http://www.bioconductor.org/</a:t>
             </a:r>
@@ -9420,7 +9432,7 @@
               <a:rPr lang="en-US" sz="1900" dirty="0">
                 <a:latin typeface="Calibri" charset="0"/>
                 <a:ea typeface="ＭＳ Ｐゴシック" charset="0"/>
-                <a:hlinkClick r:id="rId11"/>
+                <a:hlinkClick r:id="rId12"/>
               </a:rPr>
               <a:t>http://compbio.mit.edu/cummeRbund</a:t>
             </a:r>
@@ -9428,7 +9440,7 @@
               <a:rPr lang="en-US" sz="1900" dirty="0" smtClean="0">
                 <a:latin typeface="Calibri" charset="0"/>
                 <a:ea typeface="ＭＳ Ｐゴシック" charset="0"/>
-                <a:hlinkClick r:id="rId11"/>
+                <a:hlinkClick r:id="rId12"/>
               </a:rPr>
               <a:t>/</a:t>
             </a:r>
@@ -9448,7 +9460,7 @@
               <a:rPr lang="en-US" sz="1900" dirty="0">
                 <a:latin typeface="Calibri" charset="0"/>
                 <a:ea typeface="ＭＳ Ｐゴシック" charset="0"/>
-                <a:hlinkClick r:id="rId12"/>
+                <a:hlinkClick r:id="rId13"/>
               </a:rPr>
               <a:t>http://www.bioconductor.org/packages/release/bioc/html/</a:t>
             </a:r>
@@ -9456,7 +9468,7 @@
               <a:rPr lang="en-US" sz="1900" dirty="0" smtClean="0">
                 <a:latin typeface="Calibri" charset="0"/>
                 <a:ea typeface="ＭＳ Ｐゴシック" charset="0"/>
-                <a:hlinkClick r:id="rId12"/>
+                <a:hlinkClick r:id="rId13"/>
               </a:rPr>
               <a:t>edgeR.html</a:t>
             </a:r>
@@ -9495,7 +9507,7 @@
               <a:rPr lang="en-US" sz="1900" dirty="0">
                 <a:latin typeface="Calibri" charset="0"/>
                 <a:ea typeface="ＭＳ Ｐゴシック" charset="0"/>
-                <a:hlinkClick r:id="rId13"/>
+                <a:hlinkClick r:id="rId14"/>
               </a:rPr>
               <a:t>http://samstat.sourceforge.net</a:t>
             </a:r>
@@ -9503,7 +9515,7 @@
               <a:rPr lang="en-US" sz="1900" dirty="0" smtClean="0">
                 <a:latin typeface="Calibri" charset="0"/>
                 <a:ea typeface="ＭＳ Ｐゴシック" charset="0"/>
-                <a:hlinkClick r:id="rId13"/>
+                <a:hlinkClick r:id="rId14"/>
               </a:rPr>
               <a:t>/</a:t>
             </a:r>
@@ -9542,7 +9554,7 @@
               <a:rPr lang="en-US" sz="1900" dirty="0">
                 <a:latin typeface="Calibri" charset="0"/>
                 <a:ea typeface="ＭＳ Ｐゴシック" charset="0"/>
-                <a:hlinkClick r:id="rId14"/>
+                <a:hlinkClick r:id="rId15"/>
               </a:rPr>
               <a:t>https://sites.google.com/a/brown.edu/bioinformatics-in-biomed/</a:t>
             </a:r>
@@ -9550,7 +9562,7 @@
               <a:rPr lang="en-US" sz="1900" dirty="0" smtClean="0">
                 <a:latin typeface="Calibri" charset="0"/>
                 <a:ea typeface="ＭＳ Ｐゴシック" charset="0"/>
-                <a:hlinkClick r:id="rId14"/>
+                <a:hlinkClick r:id="rId15"/>
               </a:rPr>
               <a:t>fastqc</a:t>
             </a:r>
@@ -9589,30 +9601,25 @@
               <a:rPr lang="en-US" sz="1900" dirty="0">
                 <a:latin typeface="Calibri" charset="0"/>
                 <a:ea typeface="ＭＳ Ｐゴシック" charset="0"/>
-                <a:hlinkClick r:id="rId15"/>
-              </a:rPr>
-              <a:t>http://picard.sourceforge.net</a:t>
+                <a:hlinkClick r:id="rId16"/>
+              </a:rPr>
+              <a:t>http://broadinstitute.github.io/picard</a:t>
             </a:r>
             <a:r>
               <a:rPr lang="en-US" sz="1900" dirty="0" smtClean="0">
                 <a:latin typeface="Calibri" charset="0"/>
                 <a:ea typeface="ＭＳ Ｐゴシック" charset="0"/>
-                <a:hlinkClick r:id="rId15"/>
+                <a:hlinkClick r:id="rId16"/>
               </a:rPr>
               <a:t>/</a:t>
             </a:r>
-            <a:endParaRPr lang="en-US" sz="1900" dirty="0" smtClean="0">
-              <a:latin typeface="Calibri" charset="0"/>
-              <a:ea typeface="ＭＳ Ｐゴシック" charset="0"/>
-            </a:endParaRPr>
-          </a:p>
-          <a:p>
-            <a:pPr lvl="1">
-              <a:lnSpc>
-                <a:spcPct val="80000"/>
-              </a:lnSpc>
-              <a:defRPr/>
-            </a:pPr>
+            <a:r>
+              <a:rPr lang="en-US" sz="1900" dirty="0" smtClean="0">
+                <a:latin typeface="Calibri" charset="0"/>
+                <a:ea typeface="ＭＳ Ｐゴシック" charset="0"/>
+              </a:rPr>
+              <a:t> </a:t>
+            </a:r>
             <a:endParaRPr lang="en-US" sz="2300" dirty="0" smtClean="0">
               <a:latin typeface="Calibri" charset="0"/>
               <a:ea typeface="ＭＳ Ｐゴシック" charset="0"/>
@@ -9718,41 +9725,96 @@
           <a:lstStyle/>
           <a:p>
             <a:r>
-              <a:rPr lang="en-US">
-                <a:latin typeface="Calibri" charset="0"/>
-                <a:ea typeface="ＭＳ Ｐゴシック" charset="0"/>
-              </a:rPr>
-              <a:t>All reference files are obtained from the Illumina iGenomes project</a:t>
+              <a:rPr lang="en-US" dirty="0">
+                <a:latin typeface="Calibri" charset="0"/>
+                <a:ea typeface="ＭＳ Ｐゴシック" charset="0"/>
+              </a:rPr>
+              <a:t>All reference files are obtained from the </a:t>
+            </a:r>
+            <a:r>
+              <a:rPr lang="en-US" dirty="0" err="1">
+                <a:latin typeface="Calibri" charset="0"/>
+                <a:ea typeface="ＭＳ Ｐゴシック" charset="0"/>
+              </a:rPr>
+              <a:t>Illumina</a:t>
+            </a:r>
+            <a:r>
+              <a:rPr lang="en-US" dirty="0">
+                <a:latin typeface="Calibri" charset="0"/>
+                <a:ea typeface="ＭＳ Ｐゴシック" charset="0"/>
+              </a:rPr>
+              <a:t> </a:t>
+            </a:r>
+            <a:r>
+              <a:rPr lang="en-US" dirty="0" err="1">
+                <a:latin typeface="Calibri" charset="0"/>
+                <a:ea typeface="ＭＳ Ｐゴシック" charset="0"/>
+              </a:rPr>
+              <a:t>iGenomes</a:t>
+            </a:r>
+            <a:r>
+              <a:rPr lang="en-US" dirty="0">
+                <a:latin typeface="Calibri" charset="0"/>
+                <a:ea typeface="ＭＳ Ｐゴシック" charset="0"/>
+              </a:rPr>
+              <a:t> project</a:t>
             </a:r>
           </a:p>
           <a:p>
             <a:pPr lvl="1"/>
             <a:r>
-              <a:rPr lang="en-US">
+              <a:rPr lang="en-US" dirty="0">
                 <a:latin typeface="Calibri" charset="0"/>
                 <a:ea typeface="ＭＳ Ｐゴシック" charset="0"/>
                 <a:hlinkClick r:id="rId3"/>
               </a:rPr>
-              <a:t>http://cufflinks.cbcb.umd.edu/igenomes.html</a:t>
-            </a:r>
-            <a:endParaRPr lang="en-US">
+              <a:t>http://cole-trapnell-lab.github.io/cufflinks//igenome_table/</a:t>
+            </a:r>
+            <a:r>
+              <a:rPr lang="en-US" dirty="0" smtClean="0">
+                <a:latin typeface="Calibri" charset="0"/>
+                <a:ea typeface="ＭＳ Ｐゴシック" charset="0"/>
+                <a:hlinkClick r:id="rId3"/>
+              </a:rPr>
+              <a:t>index.html</a:t>
+            </a:r>
+            <a:endParaRPr lang="en-US" dirty="0" smtClean="0">
               <a:latin typeface="Calibri" charset="0"/>
               <a:ea typeface="ＭＳ Ｐゴシック" charset="0"/>
             </a:endParaRPr>
           </a:p>
           <a:p>
-            <a:r>
-              <a:rPr lang="en-US">
-                <a:latin typeface="Calibri" charset="0"/>
-                <a:ea typeface="ＭＳ Ｐゴシック" charset="0"/>
-              </a:rPr>
-              <a:t>This step downloads reference human genome files from iGenomes</a:t>
-            </a:r>
-          </a:p>
-          <a:p>
             <a:pPr lvl="1"/>
             <a:r>
-              <a:rPr lang="en-US">
+              <a:rPr lang="en-US" dirty="0" smtClean="0">
+                <a:latin typeface="Calibri" charset="0"/>
+                <a:ea typeface="ＭＳ Ｐゴシック" charset="0"/>
+              </a:rPr>
+              <a:t>This </a:t>
+            </a:r>
+            <a:r>
+              <a:rPr lang="en-US" dirty="0">
+                <a:latin typeface="Calibri" charset="0"/>
+                <a:ea typeface="ＭＳ Ｐゴシック" charset="0"/>
+              </a:rPr>
+              <a:t>step downloads reference human genome files from </a:t>
+            </a:r>
+            <a:r>
+              <a:rPr lang="en-US" dirty="0" err="1">
+                <a:latin typeface="Calibri" charset="0"/>
+                <a:ea typeface="ＭＳ Ｐゴシック" charset="0"/>
+              </a:rPr>
+              <a:t>iGenomes</a:t>
+            </a:r>
+            <a:endParaRPr lang="en-US" dirty="0">
+              <a:latin typeface="Calibri" charset="0"/>
+              <a:ea typeface="ＭＳ Ｐゴシック" charset="0"/>
+            </a:endParaRPr>
+          </a:p>
+          <a:p>
+            <a:pPr lvl="1"/>
+            <a:r>
+              <a:rPr lang="en-US" dirty="0">
                 <a:latin typeface="Calibri" charset="0"/>
                 <a:ea typeface="ＭＳ Ｐゴシック" charset="0"/>
               </a:rPr>
@@ -9761,7 +9823,7 @@
           </a:p>
           <a:p>
             <a:r>
-              <a:rPr lang="en-US">
+              <a:rPr lang="en-US" dirty="0">
                 <a:latin typeface="Calibri" charset="0"/>
                 <a:ea typeface="ＭＳ Ｐゴシック" charset="0"/>
               </a:rPr>
@@ -9771,7 +9833,7 @@
           <a:p>
             <a:pPr lvl="1"/>
             <a:r>
-              <a:rPr lang="en-US">
+              <a:rPr lang="en-US" dirty="0">
                 <a:latin typeface="Calibri" charset="0"/>
                 <a:ea typeface="ＭＳ Ｐゴシック" charset="0"/>
               </a:rPr>
@@ -9781,7 +9843,7 @@
           <a:p>
             <a:pPr lvl="1"/>
             <a:r>
-              <a:rPr lang="en-US">
+              <a:rPr lang="en-US" dirty="0">
                 <a:latin typeface="Calibri" charset="0"/>
                 <a:ea typeface="ＭＳ Ｐゴシック" charset="0"/>
               </a:rPr>
@@ -9888,24 +9950,67 @@
           <a:lstStyle/>
           <a:p>
             <a:r>
-              <a:rPr lang="en-US">
-                <a:latin typeface="Calibri" charset="0"/>
-                <a:ea typeface="ＭＳ Ｐゴシック" charset="0"/>
-              </a:rPr>
-              <a:t>All annotation files are obtained from the Illumina iGenomes project</a:t>
+              <a:rPr lang="en-US" dirty="0">
+                <a:latin typeface="Calibri" charset="0"/>
+                <a:ea typeface="ＭＳ Ｐゴシック" charset="0"/>
+              </a:rPr>
+              <a:t>All annotation files are obtained from the </a:t>
+            </a:r>
+            <a:r>
+              <a:rPr lang="en-US" dirty="0" err="1">
+                <a:latin typeface="Calibri" charset="0"/>
+                <a:ea typeface="ＭＳ Ｐゴシック" charset="0"/>
+              </a:rPr>
+              <a:t>Illumina</a:t>
+            </a:r>
+            <a:r>
+              <a:rPr lang="en-US" dirty="0">
+                <a:latin typeface="Calibri" charset="0"/>
+                <a:ea typeface="ＭＳ Ｐゴシック" charset="0"/>
+              </a:rPr>
+              <a:t> </a:t>
+            </a:r>
+            <a:r>
+              <a:rPr lang="en-US" dirty="0" err="1">
+                <a:latin typeface="Calibri" charset="0"/>
+                <a:ea typeface="ＭＳ Ｐゴシック" charset="0"/>
+              </a:rPr>
+              <a:t>iGenomes</a:t>
+            </a:r>
+            <a:r>
+              <a:rPr lang="en-US" dirty="0">
+                <a:latin typeface="Calibri" charset="0"/>
+                <a:ea typeface="ＭＳ Ｐゴシック" charset="0"/>
+              </a:rPr>
+              <a:t> project</a:t>
             </a:r>
           </a:p>
           <a:p>
             <a:pPr lvl="1"/>
             <a:r>
-              <a:rPr lang="en-US">
+              <a:rPr lang="en-US" dirty="0">
                 <a:latin typeface="Calibri" charset="0"/>
                 <a:ea typeface="ＭＳ Ｐゴシック" charset="0"/>
                 <a:hlinkClick r:id="rId3"/>
               </a:rPr>
-              <a:t>http://cufflinks.cbcb.umd.edu/igenomes.html</a:t>
-            </a:r>
-            <a:endParaRPr lang="en-US">
+              <a:t>http://cole-trapnell-lab.github.io/cufflinks//igenome_table/</a:t>
+            </a:r>
+            <a:r>
+              <a:rPr lang="en-US" dirty="0" smtClean="0">
+                <a:latin typeface="Calibri" charset="0"/>
+                <a:ea typeface="ＭＳ Ｐゴシック" charset="0"/>
+                <a:hlinkClick r:id="rId3"/>
+              </a:rPr>
+              <a:t>index.html</a:t>
+            </a:r>
+            <a:r>
+              <a:rPr lang="en-US" dirty="0" smtClean="0">
+                <a:latin typeface="Calibri" charset="0"/>
+                <a:ea typeface="ＭＳ Ｐゴシック" charset="0"/>
+              </a:rPr>
+              <a:t> </a:t>
+            </a:r>
+            <a:endParaRPr lang="en-US" dirty="0">
               <a:latin typeface="Calibri" charset="0"/>
               <a:ea typeface="ＭＳ Ｐゴシック" charset="0"/>
             </a:endParaRPr>
@@ -9917,11 +10022,18 @@
               </a:lnSpc>
             </a:pPr>
             <a:r>
-              <a:rPr lang="en-US">
-                <a:latin typeface="Calibri" charset="0"/>
-                <a:ea typeface="ＭＳ Ｐゴシック" charset="0"/>
-              </a:rPr>
-              <a:t>There are many other ways to obtain gene annotation files. For example:</a:t>
+              <a:rPr lang="en-US" dirty="0" smtClean="0">
+                <a:latin typeface="Calibri" charset="0"/>
+                <a:ea typeface="ＭＳ Ｐゴシック" charset="0"/>
+              </a:rPr>
+              <a:t>There </a:t>
+            </a:r>
+            <a:r>
+              <a:rPr lang="en-US" dirty="0">
+                <a:latin typeface="Calibri" charset="0"/>
+                <a:ea typeface="ＭＳ Ｐゴシック" charset="0"/>
+              </a:rPr>
+              <a:t>are many other ways to obtain gene annotation files. For example:</a:t>
             </a:r>
           </a:p>
           <a:p>
@@ -9931,11 +10043,53 @@
               </a:lnSpc>
             </a:pPr>
             <a:r>
-              <a:rPr lang="en-US">
-                <a:latin typeface="Calibri" charset="0"/>
-                <a:ea typeface="ＭＳ Ｐゴシック" charset="0"/>
-              </a:rPr>
-              <a:t>UCSC Genome Browser, Ensembl API, BioMart, Entrez, Galaxy, etc. could also be used</a:t>
+              <a:rPr lang="en-US" dirty="0">
+                <a:latin typeface="Calibri" charset="0"/>
+                <a:ea typeface="ＭＳ Ｐゴシック" charset="0"/>
+              </a:rPr>
+              <a:t>UCSC Genome Browser, </a:t>
+            </a:r>
+            <a:r>
+              <a:rPr lang="en-US" dirty="0" err="1">
+                <a:latin typeface="Calibri" charset="0"/>
+                <a:ea typeface="ＭＳ Ｐゴシック" charset="0"/>
+              </a:rPr>
+              <a:t>Ensembl</a:t>
+            </a:r>
+            <a:r>
+              <a:rPr lang="en-US" dirty="0">
+                <a:latin typeface="Calibri" charset="0"/>
+                <a:ea typeface="ＭＳ Ｐゴシック" charset="0"/>
+              </a:rPr>
+              <a:t> API, </a:t>
+            </a:r>
+            <a:r>
+              <a:rPr lang="en-US" dirty="0" err="1">
+                <a:latin typeface="Calibri" charset="0"/>
+                <a:ea typeface="ＭＳ Ｐゴシック" charset="0"/>
+              </a:rPr>
+              <a:t>BioMart</a:t>
+            </a:r>
+            <a:r>
+              <a:rPr lang="en-US" dirty="0">
+                <a:latin typeface="Calibri" charset="0"/>
+                <a:ea typeface="ＭＳ Ｐゴシック" charset="0"/>
+              </a:rPr>
+              <a:t>, </a:t>
+            </a:r>
+            <a:r>
+              <a:rPr lang="en-US" dirty="0" err="1">
+                <a:latin typeface="Calibri" charset="0"/>
+                <a:ea typeface="ＭＳ Ｐゴシック" charset="0"/>
+              </a:rPr>
+              <a:t>Entrez</a:t>
+            </a:r>
+            <a:r>
+              <a:rPr lang="en-US" dirty="0">
+                <a:latin typeface="Calibri" charset="0"/>
+                <a:ea typeface="ＭＳ Ｐゴシック" charset="0"/>
+              </a:rPr>
+              <a:t>, Galaxy, etc. could also be used</a:t>
             </a:r>
           </a:p>
           <a:p>
@@ -9945,7 +10099,7 @@
               </a:lnSpc>
             </a:pPr>
             <a:r>
-              <a:rPr lang="en-US">
+              <a:rPr lang="en-US" dirty="0">
                 <a:latin typeface="Calibri" charset="0"/>
                 <a:ea typeface="ＭＳ Ｐゴシック" charset="0"/>
               </a:rPr>
@@ -9959,7 +10113,7 @@
               </a:lnSpc>
             </a:pPr>
             <a:r>
-              <a:rPr lang="en-US">
+              <a:rPr lang="en-US" dirty="0">
                 <a:latin typeface="Calibri" charset="0"/>
                 <a:ea typeface="ＭＳ Ｐゴシック" charset="0"/>
               </a:rPr>
@@ -9973,14 +10127,14 @@
               </a:lnSpc>
             </a:pPr>
             <a:r>
-              <a:rPr lang="en-US">
+              <a:rPr lang="en-US" dirty="0">
                 <a:latin typeface="Calibri" charset="0"/>
                 <a:ea typeface="ＭＳ Ｐゴシック" charset="0"/>
                 <a:hlinkClick r:id="rId4"/>
               </a:rPr>
               <a:t>http://genome.ucsc.edu/FAQ/FAQformat.html#format4</a:t>
             </a:r>
-            <a:endParaRPr lang="en-US">
+            <a:endParaRPr lang="en-US" dirty="0">
               <a:latin typeface="Calibri" charset="0"/>
               <a:ea typeface="ＭＳ Ｐゴシック" charset="0"/>
             </a:endParaRPr>

</xml_diff>